<commit_message>
report (just need some results)
</commit_message>
<xml_diff>
--- a/Assignments/Graph Coloring/report/figures.pptx
+++ b/Assignments/Graph Coloring/report/figures.pptx
@@ -14006,6 +14006,9 @@
           <a:prstGeom prst="rect">
             <a:avLst/>
           </a:prstGeom>
+          <a:solidFill>
+            <a:srgbClr val="FFC000"/>
+          </a:solidFill>
           <a:ln>
             <a:noFill/>
           </a:ln>
@@ -16682,7 +16685,7 @@
         </p:nvSpPr>
         <p:spPr>
           <a:xfrm>
-            <a:off x="3213562" y="6487605"/>
+            <a:off x="4697110" y="6626400"/>
             <a:ext cx="1445428" cy="1200329"/>
           </a:xfrm>
           <a:prstGeom prst="rect">

</xml_diff>